<commit_message>
IW5-01 Added references to code examples.
</commit_message>
<xml_diff>
--- a/Lectures/IW5-01-Uvod_do_platformy_NET_zklady_C#.pptx
+++ b/Lectures/IW5-01-Uvod_do_platformy_NET_zklady_C#.pptx
@@ -18030,7 +18030,58 @@
               </a:rPr>
               <a:t>);  </a:t>
             </a:r>
-            <a:endParaRPr lang="cs-CZ" b="1" dirty="0"/>
+          </a:p>
+          <a:p>
+            <a:endParaRPr lang="en-US" b="1" dirty="0">
+              <a:solidFill>
+                <a:srgbClr val="000000"/>
+              </a:solidFill>
+              <a:highlight>
+                <a:srgbClr val="FFFFFF"/>
+              </a:highlight>
+              <a:latin typeface="Consolas"/>
+            </a:endParaRPr>
+          </a:p>
+          <a:p>
+            <a:endParaRPr lang="en-US" b="1" dirty="0">
+              <a:solidFill>
+                <a:srgbClr val="000000"/>
+              </a:solidFill>
+              <a:highlight>
+                <a:srgbClr val="FFFFFF"/>
+              </a:highlight>
+              <a:latin typeface="Consolas"/>
+            </a:endParaRPr>
+          </a:p>
+          <a:p>
+            <a:endParaRPr lang="en-US" b="1" dirty="0">
+              <a:solidFill>
+                <a:srgbClr val="000000"/>
+              </a:solidFill>
+              <a:highlight>
+                <a:srgbClr val="FFFFFF"/>
+              </a:highlight>
+              <a:latin typeface="Consolas"/>
+            </a:endParaRPr>
+          </a:p>
+          <a:p>
+            <a:pPr algn="r"/>
+            <a:r>
+              <a:rPr lang="en-US" dirty="0" err="1">
+                <a:solidFill>
+                  <a:srgbClr val="0000FF"/>
+                </a:solidFill>
+                <a:highlight>
+                  <a:srgbClr val="FFFFFF"/>
+                </a:highlight>
+              </a:rPr>
+              <a:t>IntegralOverflow.cs</a:t>
+            </a:r>
+            <a:endParaRPr lang="cs-CZ" b="1" dirty="0">
+              <a:solidFill>
+                <a:srgbClr val="0000FF"/>
+              </a:solidFill>
+            </a:endParaRPr>
           </a:p>
           <a:p>
             <a:endParaRPr lang="cs-CZ" dirty="0"/>
@@ -20053,7 +20104,33 @@
               </a:rPr>
               <a:t>// True</a:t>
             </a:r>
-            <a:endParaRPr lang="en-US" sz="1800" dirty="0"/>
+          </a:p>
+          <a:p>
+            <a:endParaRPr lang="en-US" sz="1800" dirty="0">
+              <a:solidFill>
+                <a:srgbClr val="008000"/>
+              </a:solidFill>
+              <a:highlight>
+                <a:srgbClr val="FFFFFF"/>
+              </a:highlight>
+              <a:latin typeface="Consolas"/>
+            </a:endParaRPr>
+          </a:p>
+          <a:p>
+            <a:pPr algn="r"/>
+            <a:r>
+              <a:rPr lang="en-US" sz="1800" dirty="0" err="1">
+                <a:solidFill>
+                  <a:srgbClr val="0000FF"/>
+                </a:solidFill>
+              </a:rPr>
+              <a:t>SpecialFloatAndDoubleValues.cs</a:t>
+            </a:r>
+            <a:endParaRPr lang="en-US" sz="1800" dirty="0">
+              <a:solidFill>
+                <a:srgbClr val="0000FF"/>
+              </a:solidFill>
+            </a:endParaRPr>
           </a:p>
         </p:txBody>
       </p:sp>
@@ -20502,7 +20579,47 @@
               <a:buFont typeface="Arial" pitchFamily="34" charset="0"/>
               <a:buChar char="•"/>
             </a:pPr>
-            <a:endParaRPr lang="cs-CZ" b="1" dirty="0"/>
+            <a:endParaRPr lang="en-US" b="1" dirty="0"/>
+          </a:p>
+          <a:p>
+            <a:pPr lvl="1">
+              <a:buFont typeface="Arial" pitchFamily="34" charset="0"/>
+              <a:buChar char="•"/>
+            </a:pPr>
+            <a:endParaRPr lang="en-US" b="1" dirty="0"/>
+          </a:p>
+          <a:p>
+            <a:pPr lvl="1">
+              <a:buFont typeface="Arial" pitchFamily="34" charset="0"/>
+              <a:buChar char="•"/>
+            </a:pPr>
+            <a:endParaRPr lang="en-US" b="1" dirty="0"/>
+          </a:p>
+          <a:p>
+            <a:pPr lvl="1">
+              <a:buFont typeface="Arial" pitchFamily="34" charset="0"/>
+              <a:buChar char="•"/>
+            </a:pPr>
+            <a:endParaRPr lang="en-US" b="1" dirty="0"/>
+          </a:p>
+          <a:p>
+            <a:pPr lvl="1" algn="r">
+              <a:buFont typeface="Arial" pitchFamily="34" charset="0"/>
+              <a:buChar char="•"/>
+            </a:pPr>
+            <a:r>
+              <a:rPr lang="en-US" dirty="0" err="1">
+                <a:solidFill>
+                  <a:srgbClr val="0000FF"/>
+                </a:solidFill>
+              </a:rPr>
+              <a:t>NumberComparation.cs</a:t>
+            </a:r>
+            <a:endParaRPr lang="cs-CZ" b="1" dirty="0">
+              <a:solidFill>
+                <a:srgbClr val="0000FF"/>
+              </a:solidFill>
+            </a:endParaRPr>
           </a:p>
         </p:txBody>
       </p:sp>
@@ -21118,7 +21235,69 @@
               </a:rPr>
               <a:t>}</a:t>
             </a:r>
-            <a:endParaRPr lang="en-US" dirty="0"/>
+          </a:p>
+          <a:p>
+            <a:endParaRPr lang="en-US" dirty="0">
+              <a:solidFill>
+                <a:srgbClr val="000000"/>
+              </a:solidFill>
+              <a:highlight>
+                <a:srgbClr val="FFFFFF"/>
+              </a:highlight>
+              <a:latin typeface="Consolas"/>
+            </a:endParaRPr>
+          </a:p>
+          <a:p>
+            <a:endParaRPr lang="en-US" dirty="0">
+              <a:solidFill>
+                <a:srgbClr val="000000"/>
+              </a:solidFill>
+              <a:highlight>
+                <a:srgbClr val="FFFFFF"/>
+              </a:highlight>
+              <a:latin typeface="Consolas"/>
+            </a:endParaRPr>
+          </a:p>
+          <a:p>
+            <a:endParaRPr lang="en-US" dirty="0">
+              <a:solidFill>
+                <a:srgbClr val="000000"/>
+              </a:solidFill>
+              <a:highlight>
+                <a:srgbClr val="FFFFFF"/>
+              </a:highlight>
+              <a:latin typeface="Consolas"/>
+            </a:endParaRPr>
+          </a:p>
+          <a:p>
+            <a:endParaRPr lang="en-US" dirty="0">
+              <a:solidFill>
+                <a:srgbClr val="0000FF"/>
+              </a:solidFill>
+              <a:highlight>
+                <a:srgbClr val="FFFFFF"/>
+              </a:highlight>
+              <a:latin typeface="Consolas"/>
+            </a:endParaRPr>
+          </a:p>
+          <a:p>
+            <a:pPr algn="r"/>
+            <a:r>
+              <a:rPr lang="en-US" dirty="0" err="1">
+                <a:solidFill>
+                  <a:srgbClr val="0000FF"/>
+                </a:solidFill>
+                <a:highlight>
+                  <a:srgbClr val="FFFFFF"/>
+                </a:highlight>
+              </a:rPr>
+              <a:t>NumberComparation.cs</a:t>
+            </a:r>
+            <a:endParaRPr lang="en-US" dirty="0">
+              <a:solidFill>
+                <a:srgbClr val="0000FF"/>
+              </a:solidFill>
+            </a:endParaRPr>
           </a:p>
         </p:txBody>
       </p:sp>
@@ -28317,7 +28496,12 @@
             <p:ph idx="1"/>
           </p:nvPr>
         </p:nvSpPr>
-        <p:spPr/>
+        <p:spPr>
+          <a:xfrm>
+            <a:off x="107443" y="1412874"/>
+            <a:ext cx="8929115" cy="5040504"/>
+          </a:xfrm>
+        </p:spPr>
         <p:txBody>
           <a:bodyPr/>
           <a:lstStyle/>
@@ -29260,9 +29444,23 @@
               </a:rPr>
               <a:t>// Vaughan</a:t>
             </a:r>
-            <a:endParaRPr lang="en-US" sz="1600" dirty="0">
+          </a:p>
+          <a:p>
+            <a:pPr algn="r"/>
+            <a:r>
+              <a:rPr lang="en-US" sz="1600" dirty="0" err="1">
+                <a:solidFill>
+                  <a:srgbClr val="0000FF"/>
+                </a:solidFill>
+                <a:highlight>
+                  <a:srgbClr val="FFFFFF"/>
+                </a:highlight>
+              </a:rPr>
+              <a:t>MethodArguments.cs</a:t>
+            </a:r>
+            <a:endParaRPr lang="en-US" sz="1100" dirty="0">
               <a:solidFill>
-                <a:srgbClr val="000000"/>
+                <a:srgbClr val="0000FF"/>
               </a:solidFill>
               <a:highlight>
                 <a:srgbClr val="FFFFFF"/>
@@ -29964,6 +30162,31 @@
               </a:rPr>
               <a:t>// 10</a:t>
             </a:r>
+          </a:p>
+          <a:p>
+            <a:pPr algn="r"/>
+            <a:r>
+              <a:rPr lang="en-US" sz="1800" dirty="0" err="1">
+                <a:solidFill>
+                  <a:srgbClr val="0000FF"/>
+                </a:solidFill>
+                <a:highlight>
+                  <a:srgbClr val="FFFFFF"/>
+                </a:highlight>
+              </a:rPr>
+              <a:t>MethodArguments.cs</a:t>
+            </a:r>
+            <a:endParaRPr lang="en-US" sz="1200" dirty="0">
+              <a:solidFill>
+                <a:srgbClr val="0000FF"/>
+              </a:solidFill>
+              <a:highlight>
+                <a:srgbClr val="FFFFFF"/>
+              </a:highlight>
+              <a:latin typeface="Consolas"/>
+            </a:endParaRPr>
+          </a:p>
+          <a:p>
             <a:endParaRPr lang="en-US" sz="1800" dirty="0">
               <a:solidFill>
                 <a:srgbClr val="000000"/>
@@ -30510,6 +30733,37 @@
               </a:rPr>
               <a:t>);</a:t>
             </a:r>
+          </a:p>
+          <a:p>
+            <a:pPr lvl="2">
+              <a:lnSpc>
+                <a:spcPct val="150000"/>
+              </a:lnSpc>
+              <a:buNone/>
+            </a:pPr>
+            <a:endParaRPr lang="en-US" b="1" dirty="0"/>
+          </a:p>
+          <a:p>
+            <a:pPr lvl="2" algn="r">
+              <a:lnSpc>
+                <a:spcPct val="150000"/>
+              </a:lnSpc>
+              <a:buNone/>
+            </a:pPr>
+            <a:r>
+              <a:rPr lang="en-US" dirty="0" err="1">
+                <a:solidFill>
+                  <a:srgbClr val="0000FF"/>
+                </a:solidFill>
+              </a:rPr>
+              <a:t>MethodArguments.cs</a:t>
+            </a:r>
+            <a:endParaRPr lang="en-US" sz="1200" dirty="0">
+              <a:solidFill>
+                <a:srgbClr val="0000FF"/>
+              </a:solidFill>
+              <a:latin typeface="Consolas"/>
+            </a:endParaRPr>
           </a:p>
           <a:p>
             <a:pPr lvl="2">
@@ -50695,27 +50949,6 @@
 </file>
 
 <file path=customXml/item1.xml><?xml version="1.0" encoding="utf-8"?>
-<?mso-contentType ?>
-<FormTemplates xmlns="http://schemas.microsoft.com/sharepoint/v3/contenttype/forms">
-  <Display>DocumentLibraryForm</Display>
-  <Edit>DocumentLibraryForm</Edit>
-  <New>DocumentLibraryForm</New>
-</FormTemplates>
-</file>
-
-<file path=customXml/item2.xml><?xml version="1.0" encoding="utf-8"?>
-<p:properties xmlns:p="http://schemas.microsoft.com/office/2006/metadata/properties" xmlns:xsi="http://www.w3.org/2001/XMLSchema-instance">
-  <documentManagement>
-    <Typ_x0020__x0161_ablony xmlns="305ed015-8565-4686-8245-5a6f6608d307">Prezentace (Presentation)</Typ_x0020__x0161_ablony>
-    <Org_x0020_Jednotka xmlns="305ed015-8565-4686-8245-5a6f6608d307">ALL</Org_x0020_Jednotka>
-    <Jazyk xmlns="305ed015-8565-4686-8245-5a6f6608d307">CZ</Jazyk>
-    <Vlastn_x00ed_k xmlns="305ed015-8565-4686-8245-5a6f6608d307">CC</Vlastn_x00ed_k>
-    <T_x00e9_ma xmlns="305ed015-8565-4686-8245-5a6f6608d307">Marketing</T_x00e9_ma>
-  </documentManagement>
-</p:properties>
-</file>
-
-<file path=customXml/item3.xml><?xml version="1.0" encoding="utf-8"?>
 <ct:contentTypeSchema xmlns:ct="http://schemas.microsoft.com/office/2006/metadata/contentType" xmlns:ma="http://schemas.microsoft.com/office/2006/metadata/properties/metaAttributes" ct:_="" ma:_="" ma:contentTypeName="Document" ma:contentTypeID="0x01010043E1F1D228625A40A2DD89FD0D534334" ma:contentTypeVersion="5" ma:contentTypeDescription="Create a new document." ma:contentTypeScope="" ma:versionID="3c3cdac864ea44490d5feb2289df447b">
   <xsd:schema xmlns:xsd="http://www.w3.org/2001/XMLSchema" xmlns:p="http://schemas.microsoft.com/office/2006/metadata/properties" xmlns:ns2="305ed015-8565-4686-8245-5a6f6608d307" targetNamespace="http://schemas.microsoft.com/office/2006/metadata/properties" ma:root="true" ma:fieldsID="41e535ac8a181a7ae43b4c19f50876ca" ns2:_="">
     <xsd:import namespace="305ed015-8565-4686-8245-5a6f6608d307"/>
@@ -50882,30 +51115,28 @@
 </ct:contentTypeSchema>
 </file>
 
-<file path=customXml/itemProps1.xml><?xml version="1.0" encoding="utf-8"?>
-<ds:datastoreItem xmlns:ds="http://schemas.openxmlformats.org/officeDocument/2006/customXml" ds:itemID="{68E9ACD9-562C-4E45-98C9-78111DF73B73}">
-  <ds:schemaRefs>
-    <ds:schemaRef ds:uri="http://schemas.microsoft.com/sharepoint/v3/contenttype/forms"/>
-  </ds:schemaRefs>
-</ds:datastoreItem>
+<file path=customXml/item2.xml><?xml version="1.0" encoding="utf-8"?>
+<?mso-contentType ?>
+<FormTemplates xmlns="http://schemas.microsoft.com/sharepoint/v3/contenttype/forms">
+  <Display>DocumentLibraryForm</Display>
+  <Edit>DocumentLibraryForm</Edit>
+  <New>DocumentLibraryForm</New>
+</FormTemplates>
 </file>
 
-<file path=customXml/itemProps2.xml><?xml version="1.0" encoding="utf-8"?>
-<ds:datastoreItem xmlns:ds="http://schemas.openxmlformats.org/officeDocument/2006/customXml" ds:itemID="{FA78BBDB-95CB-4C59-A8AB-58166EF53EC4}">
-  <ds:schemaRefs>
-    <ds:schemaRef ds:uri="305ed015-8565-4686-8245-5a6f6608d307"/>
-    <ds:schemaRef ds:uri="http://purl.org/dc/terms/"/>
-    <ds:schemaRef ds:uri="http://schemas.openxmlformats.org/package/2006/metadata/core-properties"/>
-    <ds:schemaRef ds:uri="http://purl.org/dc/dcmitype/"/>
-    <ds:schemaRef ds:uri="http://schemas.microsoft.com/office/2006/documentManagement/types"/>
-    <ds:schemaRef ds:uri="http://purl.org/dc/elements/1.1/"/>
-    <ds:schemaRef ds:uri="http://schemas.microsoft.com/office/2006/metadata/properties"/>
-    <ds:schemaRef ds:uri="http://www.w3.org/XML/1998/namespace"/>
-  </ds:schemaRefs>
-</ds:datastoreItem>
+<file path=customXml/item3.xml><?xml version="1.0" encoding="utf-8"?>
+<p:properties xmlns:p="http://schemas.microsoft.com/office/2006/metadata/properties" xmlns:xsi="http://www.w3.org/2001/XMLSchema-instance">
+  <documentManagement>
+    <Typ_x0020__x0161_ablony xmlns="305ed015-8565-4686-8245-5a6f6608d307">Prezentace (Presentation)</Typ_x0020__x0161_ablony>
+    <Org_x0020_Jednotka xmlns="305ed015-8565-4686-8245-5a6f6608d307">ALL</Org_x0020_Jednotka>
+    <Jazyk xmlns="305ed015-8565-4686-8245-5a6f6608d307">CZ</Jazyk>
+    <Vlastn_x00ed_k xmlns="305ed015-8565-4686-8245-5a6f6608d307">CC</Vlastn_x00ed_k>
+    <T_x00e9_ma xmlns="305ed015-8565-4686-8245-5a6f6608d307">Marketing</T_x00e9_ma>
+  </documentManagement>
+</p:properties>
 </file>
 
-<file path=customXml/itemProps3.xml><?xml version="1.0" encoding="utf-8"?>
+<file path=customXml/itemProps1.xml><?xml version="1.0" encoding="utf-8"?>
 <ds:datastoreItem xmlns:ds="http://schemas.openxmlformats.org/officeDocument/2006/customXml" ds:itemID="{257903E7-1042-4F60-A78F-E2DF85502085}">
   <ds:schemaRefs>
     <ds:schemaRef ds:uri="http://schemas.microsoft.com/office/2006/metadata/contentType"/>
@@ -50920,4 +51151,27 @@
     <ds:schemaRef ds:uri="http://schemas.microsoft.com/office/internal/2005/internalDocumentation"/>
   </ds:schemaRefs>
 </ds:datastoreItem>
+</file>
+
+<file path=customXml/itemProps2.xml><?xml version="1.0" encoding="utf-8"?>
+<ds:datastoreItem xmlns:ds="http://schemas.openxmlformats.org/officeDocument/2006/customXml" ds:itemID="{68E9ACD9-562C-4E45-98C9-78111DF73B73}">
+  <ds:schemaRefs>
+    <ds:schemaRef ds:uri="http://schemas.microsoft.com/sharepoint/v3/contenttype/forms"/>
+  </ds:schemaRefs>
+</ds:datastoreItem>
+</file>
+
+<file path=customXml/itemProps3.xml><?xml version="1.0" encoding="utf-8"?>
+<ds:datastoreItem xmlns:ds="http://schemas.openxmlformats.org/officeDocument/2006/customXml" ds:itemID="{FA78BBDB-95CB-4C59-A8AB-58166EF53EC4}">
+  <ds:schemaRefs>
+    <ds:schemaRef ds:uri="305ed015-8565-4686-8245-5a6f6608d307"/>
+    <ds:schemaRef ds:uri="http://purl.org/dc/terms/"/>
+    <ds:schemaRef ds:uri="http://schemas.openxmlformats.org/package/2006/metadata/core-properties"/>
+    <ds:schemaRef ds:uri="http://purl.org/dc/dcmitype/"/>
+    <ds:schemaRef ds:uri="http://schemas.microsoft.com/office/2006/documentManagement/types"/>
+    <ds:schemaRef ds:uri="http://purl.org/dc/elements/1.1/"/>
+    <ds:schemaRef ds:uri="http://schemas.microsoft.com/office/2006/metadata/properties"/>
+    <ds:schemaRef ds:uri="http://www.w3.org/XML/1998/namespace"/>
+  </ds:schemaRefs>
+</ds:datastoreItem>
 </file>
</xml_diff>

<commit_message>
Fix ref to c# 6.0
</commit_message>
<xml_diff>
--- a/Lectures/IW5-01-Uvod_do_platformy_NET_zklady_C#.pptx
+++ b/Lectures/IW5-01-Uvod_do_platformy_NET_zklady_C#.pptx
@@ -49488,18 +49488,16 @@
               <a:rPr lang="cs-CZ" sz="1600" dirty="0">
                 <a:hlinkClick r:id="rId2"/>
               </a:rPr>
-              <a:t>http://www.amazon.com/5-0-Nutshell-The-Definitive-Reference/dp/1449320104</a:t>
-            </a:r>
-            <a:endParaRPr lang="cs-CZ" sz="1600" dirty="0"/>
+              <a:t>https://www.amazon.com/C-6-0-Nutshell-Definitive-Reference/dp/1491927062/</a:t>
+            </a:r>
+            <a:endParaRPr lang="en-US" sz="1600" dirty="0"/>
           </a:p>
           <a:p>
             <a:pPr lvl="1">
               <a:buFont typeface="Arial" pitchFamily="34" charset="0"/>
               <a:buChar char="•"/>
             </a:pPr>
-            <a:endParaRPr lang="cs-CZ" sz="1600" dirty="0">
-              <a:hlinkClick r:id="rId3"/>
-            </a:endParaRPr>
+            <a:endParaRPr lang="en-US" sz="1600" dirty="0"/>
           </a:p>
           <a:p>
             <a:pPr lvl="1">
@@ -50949,6 +50947,15 @@
 </file>
 
 <file path=customXml/item1.xml><?xml version="1.0" encoding="utf-8"?>
+<?mso-contentType ?>
+<FormTemplates xmlns="http://schemas.microsoft.com/sharepoint/v3/contenttype/forms">
+  <Display>DocumentLibraryForm</Display>
+  <Edit>DocumentLibraryForm</Edit>
+  <New>DocumentLibraryForm</New>
+</FormTemplates>
+</file>
+
+<file path=customXml/item2.xml><?xml version="1.0" encoding="utf-8"?>
 <p:properties xmlns:p="http://schemas.microsoft.com/office/2006/metadata/properties" xmlns:xsi="http://www.w3.org/2001/XMLSchema-instance">
   <documentManagement>
     <Typ_x0020__x0161_ablony xmlns="305ed015-8565-4686-8245-5a6f6608d307">Prezentace (Presentation)</Typ_x0020__x0161_ablony>
@@ -50960,7 +50967,7 @@
 </p:properties>
 </file>
 
-<file path=customXml/item2.xml><?xml version="1.0" encoding="utf-8"?>
+<file path=customXml/item3.xml><?xml version="1.0" encoding="utf-8"?>
 <ct:contentTypeSchema xmlns:ct="http://schemas.microsoft.com/office/2006/metadata/contentType" xmlns:ma="http://schemas.microsoft.com/office/2006/metadata/properties/metaAttributes" ct:_="" ma:_="" ma:contentTypeName="Document" ma:contentTypeID="0x01010043E1F1D228625A40A2DD89FD0D534334" ma:contentTypeVersion="5" ma:contentTypeDescription="Create a new document." ma:contentTypeScope="" ma:versionID="3c3cdac864ea44490d5feb2289df447b">
   <xsd:schema xmlns:xsd="http://www.w3.org/2001/XMLSchema" xmlns:p="http://schemas.microsoft.com/office/2006/metadata/properties" xmlns:ns2="305ed015-8565-4686-8245-5a6f6608d307" targetNamespace="http://schemas.microsoft.com/office/2006/metadata/properties" ma:root="true" ma:fieldsID="41e535ac8a181a7ae43b4c19f50876ca" ns2:_="">
     <xsd:import namespace="305ed015-8565-4686-8245-5a6f6608d307"/>
@@ -51127,16 +51134,15 @@
 </ct:contentTypeSchema>
 </file>
 
-<file path=customXml/item3.xml><?xml version="1.0" encoding="utf-8"?>
-<?mso-contentType ?>
-<FormTemplates xmlns="http://schemas.microsoft.com/sharepoint/v3/contenttype/forms">
-  <Display>DocumentLibraryForm</Display>
-  <Edit>DocumentLibraryForm</Edit>
-  <New>DocumentLibraryForm</New>
-</FormTemplates>
+<file path=customXml/itemProps1.xml><?xml version="1.0" encoding="utf-8"?>
+<ds:datastoreItem xmlns:ds="http://schemas.openxmlformats.org/officeDocument/2006/customXml" ds:itemID="{68E9ACD9-562C-4E45-98C9-78111DF73B73}">
+  <ds:schemaRefs>
+    <ds:schemaRef ds:uri="http://schemas.microsoft.com/sharepoint/v3/contenttype/forms"/>
+  </ds:schemaRefs>
+</ds:datastoreItem>
 </file>
 
-<file path=customXml/itemProps1.xml><?xml version="1.0" encoding="utf-8"?>
+<file path=customXml/itemProps2.xml><?xml version="1.0" encoding="utf-8"?>
 <ds:datastoreItem xmlns:ds="http://schemas.openxmlformats.org/officeDocument/2006/customXml" ds:itemID="{FA78BBDB-95CB-4C59-A8AB-58166EF53EC4}">
   <ds:schemaRefs>
     <ds:schemaRef ds:uri="305ed015-8565-4686-8245-5a6f6608d307"/>
@@ -51151,7 +51157,7 @@
 </ds:datastoreItem>
 </file>
 
-<file path=customXml/itemProps2.xml><?xml version="1.0" encoding="utf-8"?>
+<file path=customXml/itemProps3.xml><?xml version="1.0" encoding="utf-8"?>
 <ds:datastoreItem xmlns:ds="http://schemas.openxmlformats.org/officeDocument/2006/customXml" ds:itemID="{257903E7-1042-4F60-A78F-E2DF85502085}">
   <ds:schemaRefs>
     <ds:schemaRef ds:uri="http://schemas.microsoft.com/office/2006/metadata/contentType"/>
@@ -51166,12 +51172,4 @@
     <ds:schemaRef ds:uri="http://schemas.microsoft.com/office/internal/2005/internalDocumentation"/>
   </ds:schemaRefs>
 </ds:datastoreItem>
-</file>
-
-<file path=customXml/itemProps3.xml><?xml version="1.0" encoding="utf-8"?>
-<ds:datastoreItem xmlns:ds="http://schemas.openxmlformats.org/officeDocument/2006/customXml" ds:itemID="{68E9ACD9-562C-4E45-98C9-78111DF73B73}">
-  <ds:schemaRefs>
-    <ds:schemaRef ds:uri="http://schemas.microsoft.com/sharepoint/v3/contenttype/forms"/>
-  </ds:schemaRefs>
-</ds:datastoreItem>
 </file>
</xml_diff>